<commit_message>
updated header & wording
</commit_message>
<xml_diff>
--- a/Documentation/Symposium_poster_group4.pptx
+++ b/Documentation/Symposium_poster_group4.pptx
@@ -3471,9 +3471,7 @@
             <a:avLst/>
           </a:prstGeom>
           <a:solidFill>
-            <a:schemeClr val="bg1">
-              <a:lumMod val="95000"/>
-            </a:schemeClr>
+            <a:srgbClr val="942093"/>
           </a:solidFill>
           <a:ln>
             <a:noFill/>
@@ -3621,50 +3619,39 @@
             <a:r>
               <a:rPr lang="en-US" sz="8800" b="1" dirty="0" smtClean="0">
                 <a:solidFill>
-                  <a:srgbClr val="009193"/>
+                  <a:schemeClr val="bg1"/>
                 </a:solidFill>
                 <a:latin typeface="Roboto Slab" charset="0"/>
                 <a:ea typeface="Roboto Slab" charset="0"/>
                 <a:cs typeface="Roboto Slab" charset="0"/>
               </a:rPr>
-              <a:t>TA Works</a:t>
-            </a:r>
-            <a:r>
-              <a:rPr lang="en-US" sz="8800" b="1" dirty="0" smtClean="0">
+              <a:t>TA Works | </a:t>
+            </a:r>
+            <a:r>
+              <a:rPr lang="en-CA" sz="8800" dirty="0">
                 <a:solidFill>
-                  <a:schemeClr val="accent2"/>
+                  <a:schemeClr val="bg1"/>
                 </a:solidFill>
                 <a:latin typeface="Roboto Slab" charset="0"/>
                 <a:ea typeface="Roboto Slab" charset="0"/>
                 <a:cs typeface="Roboto Slab" charset="0"/>
               </a:rPr>
-              <a:t> | </a:t>
-            </a:r>
-            <a:r>
-              <a:rPr lang="en-CA" sz="8800" dirty="0">
+              <a:t>Improving the end-to-end TA assignment process</a:t>
+            </a:r>
+            <a:r>
+              <a:rPr lang="en-US" sz="8800" dirty="0">
                 <a:solidFill>
-                  <a:srgbClr val="941E88"/>
+                  <a:schemeClr val="bg1"/>
                 </a:solidFill>
                 <a:latin typeface="Roboto Slab" charset="0"/>
                 <a:ea typeface="Roboto Slab" charset="0"/>
                 <a:cs typeface="Roboto Slab" charset="0"/>
               </a:rPr>
-              <a:t>Improving the end-to-end TA assignment process</a:t>
-            </a:r>
-            <a:r>
-              <a:rPr lang="en-US" sz="8800" dirty="0">
-                <a:solidFill>
-                  <a:srgbClr val="941E88"/>
-                </a:solidFill>
-                <a:latin typeface="Roboto Slab" charset="0"/>
-                <a:ea typeface="Roboto Slab" charset="0"/>
-                <a:cs typeface="Roboto Slab" charset="0"/>
-              </a:rPr>
               <a:t> </a:t>
             </a:r>
             <a:endParaRPr lang="en-US" sz="8800" b="1" dirty="0">
               <a:solidFill>
-                <a:srgbClr val="941E88"/>
+                <a:schemeClr val="bg1"/>
               </a:solidFill>
               <a:latin typeface="Roboto Slab" charset="0"/>
               <a:ea typeface="Roboto Slab" charset="0"/>
@@ -5138,7 +5125,6 @@
             </a:endParaRPr>
           </a:p>
           <a:p>
-            <a:pPr lvl="0"/>
             <a:r>
               <a:rPr lang="en-US" sz="4500" b="1" dirty="0">
                 <a:solidFill>
@@ -5150,8 +5136,22 @@
                 <a:ea typeface="Roboto" charset="0"/>
                 <a:cs typeface="Roboto" charset="0"/>
               </a:rPr>
-              <a:t>E</a:t>
-            </a:r>
+              <a:t>TA assignment </a:t>
+            </a:r>
+            <a:r>
+              <a:rPr lang="en-US" sz="4500" b="1" dirty="0">
+                <a:solidFill>
+                  <a:srgbClr val="941E88"/>
+                </a:solidFill>
+                <a:latin typeface="Roboto" charset="0"/>
+                <a:ea typeface="Roboto" charset="0"/>
+                <a:cs typeface="Roboto" charset="0"/>
+              </a:rPr>
+              <a:t>formulation</a:t>
+            </a:r>
+          </a:p>
+          <a:p>
+            <a:pPr lvl="0"/>
             <a:r>
               <a:rPr lang="en-US" sz="4500" b="1" dirty="0" smtClean="0">
                 <a:solidFill>
@@ -5163,10 +5163,10 @@
                 <a:ea typeface="Roboto" charset="0"/>
                 <a:cs typeface="Roboto" charset="0"/>
               </a:rPr>
-              <a:t>nd-to-end</a:t>
-            </a:r>
-            <a:r>
-              <a:rPr lang="en-US" sz="4500" b="1" dirty="0" smtClean="0">
+              <a:t>&amp; </a:t>
+            </a:r>
+            <a:r>
+              <a:rPr lang="en-US" sz="4500" b="1" smtClean="0">
                 <a:solidFill>
                   <a:srgbClr val="941E88"/>
                 </a:solidFill>
@@ -5174,13 +5174,10 @@
                 <a:ea typeface="Roboto" charset="0"/>
                 <a:cs typeface="Roboto" charset="0"/>
               </a:rPr>
-              <a:t> software system </a:t>
-            </a:r>
-          </a:p>
-          <a:p>
-            <a:pPr lvl="0"/>
-            <a:r>
-              <a:rPr lang="en-US" sz="4500" b="1" dirty="0" smtClean="0">
+              <a:t>system </a:t>
+            </a:r>
+            <a:r>
+              <a:rPr lang="en-US" sz="4500" b="1" smtClean="0">
                 <a:solidFill>
                   <a:schemeClr val="bg2">
                     <a:lumMod val="50000"/>
@@ -5190,19 +5187,16 @@
                 <a:ea typeface="Roboto" charset="0"/>
                 <a:cs typeface="Roboto" charset="0"/>
               </a:rPr>
-              <a:t>TA assignment </a:t>
-            </a:r>
-            <a:r>
-              <a:rPr lang="en-US" sz="4500" b="1" dirty="0" smtClean="0">
-                <a:solidFill>
-                  <a:srgbClr val="941E88"/>
-                </a:solidFill>
-                <a:latin typeface="Roboto" charset="0"/>
-                <a:ea typeface="Roboto" charset="0"/>
-                <a:cs typeface="Roboto" charset="0"/>
-              </a:rPr>
-              <a:t>formulation</a:t>
-            </a:r>
+              <a:t>integration</a:t>
+            </a:r>
+            <a:endParaRPr lang="en-US" sz="4500" b="1" dirty="0" smtClean="0">
+              <a:solidFill>
+                <a:srgbClr val="941E88"/>
+              </a:solidFill>
+              <a:latin typeface="Roboto" charset="0"/>
+              <a:ea typeface="Roboto" charset="0"/>
+              <a:cs typeface="Roboto" charset="0"/>
+            </a:endParaRPr>
           </a:p>
         </p:txBody>
       </p:sp>
@@ -7445,8 +7439,8 @@
           </a:p>
         </p:txBody>
       </p:sp>
-      <mc:AlternateContent xmlns:mc="http://schemas.openxmlformats.org/markup-compatibility/2006">
-        <mc:Choice xmlns:a14="http://schemas.microsoft.com/office/drawing/2010/main" Requires="a14">
+      <mc:AlternateContent xmlns:mc="http://schemas.openxmlformats.org/markup-compatibility/2006" xmlns:a14="http://schemas.microsoft.com/office/drawing/2010/main">
+        <mc:Choice Requires="a14">
           <p:sp>
             <p:nvSpPr>
               <p:cNvPr id="14" name="TextBox 13"/>
@@ -7479,18 +7473,7 @@
                     <a:ea typeface="Roboto" charset="0"/>
                     <a:cs typeface="Roboto" charset="0"/>
                   </a:rPr>
-                  <a:t>Max</a:t>
-                </a:r>
-                <a:r>
-                  <a:rPr lang="en-CA" sz="4500" dirty="0" smtClean="0">
-                    <a:solidFill>
-                      <a:prstClr val="black"/>
-                    </a:solidFill>
-                    <a:latin typeface="Roboto" charset="0"/>
-                    <a:ea typeface="Roboto" charset="0"/>
-                    <a:cs typeface="Roboto" charset="0"/>
-                  </a:rPr>
-                  <a:t> </a:t>
+                  <a:t>Max </a:t>
                 </a:r>
                 <a14:m>
                   <m:oMath xmlns:m="http://schemas.openxmlformats.org/officeDocument/2006/math">
@@ -7758,7 +7741,7 @@
             </p:txBody>
           </p:sp>
         </mc:Choice>
-        <mc:Fallback>
+        <mc:Fallback xmlns="">
           <p:sp>
             <p:nvSpPr>
               <p:cNvPr id="14" name="TextBox 13"/>

</xml_diff>